<commit_message>
SpringBoot Template Generator User Guide
</commit_message>
<xml_diff>
--- a/Spring Boot Template.pptx
+++ b/Spring Boot Template.pptx
@@ -273,7 +273,7 @@
           <a:p>
             <a:fld id="{29539153-07D0-4B28-A462-83354FEB8672}" type="datetimeFigureOut">
               <a:rPr lang="ko-KR" altLang="en-US" smtClean="0"/>
-              <a:t>2025-05-26</a:t>
+              <a:t>2025-05-28</a:t>
             </a:fld>
             <a:endParaRPr lang="ko-KR" altLang="en-US"/>
           </a:p>
@@ -726,7 +726,7 @@
           <a:p>
             <a:fld id="{1AE170B4-DCA4-4EE4-8059-4BA444242460}" type="datetime1">
               <a:rPr lang="en-US" altLang="ko-KR" smtClean="0"/>
-              <a:t>5/26/2025</a:t>
+              <a:t>5/28/2025</a:t>
             </a:fld>
             <a:endParaRPr lang="en-US" dirty="0"/>
           </a:p>
@@ -996,7 +996,7 @@
           <a:p>
             <a:fld id="{DB88A018-11F7-4D2B-9F4C-1F3FA6B7A246}" type="datetime1">
               <a:rPr lang="en-US" altLang="ko-KR" smtClean="0"/>
-              <a:t>5/26/2025</a:t>
+              <a:t>5/28/2025</a:t>
             </a:fld>
             <a:endParaRPr lang="en-US" dirty="0"/>
           </a:p>
@@ -1185,7 +1185,7 @@
           <a:p>
             <a:fld id="{D5224AE2-11DE-4744-ADC2-0FC72D27DE65}" type="datetime1">
               <a:rPr lang="en-US" altLang="ko-KR" smtClean="0"/>
-              <a:t>5/26/2025</a:t>
+              <a:t>5/28/2025</a:t>
             </a:fld>
             <a:endParaRPr lang="en-US" dirty="0"/>
           </a:p>
@@ -1453,7 +1453,7 @@
           <a:p>
             <a:fld id="{CED884C0-540B-43E9-8D52-F2B8190494CC}" type="datetime1">
               <a:rPr lang="en-US" altLang="ko-KR" smtClean="0"/>
-              <a:t>5/26/2025</a:t>
+              <a:t>5/28/2025</a:t>
             </a:fld>
             <a:endParaRPr lang="en-US" dirty="0"/>
           </a:p>
@@ -1789,7 +1789,7 @@
           <a:p>
             <a:fld id="{45713032-3AF6-4C92-9640-C4F85E329C6E}" type="datetime1">
               <a:rPr lang="en-US" altLang="ko-KR" smtClean="0"/>
-              <a:t>5/26/2025</a:t>
+              <a:t>5/28/2025</a:t>
             </a:fld>
             <a:endParaRPr lang="en-US" dirty="0"/>
           </a:p>
@@ -2407,7 +2407,7 @@
           <a:p>
             <a:fld id="{AB028887-B076-4393-893D-E6929D932534}" type="datetime1">
               <a:rPr lang="en-US" altLang="ko-KR" smtClean="0"/>
-              <a:t>5/26/2025</a:t>
+              <a:t>5/28/2025</a:t>
             </a:fld>
             <a:endParaRPr lang="en-US" dirty="0"/>
           </a:p>
@@ -3262,7 +3262,7 @@
           <a:p>
             <a:fld id="{6FF8854E-294A-401B-BB36-C160A1A5D232}" type="datetime1">
               <a:rPr lang="en-US" altLang="ko-KR" smtClean="0"/>
-              <a:t>5/26/2025</a:t>
+              <a:t>5/28/2025</a:t>
             </a:fld>
             <a:endParaRPr lang="en-US" dirty="0"/>
           </a:p>
@@ -3427,7 +3427,7 @@
           <a:p>
             <a:fld id="{64C803B0-6265-46DF-AA32-5B4D8F29B9B4}" type="datetime1">
               <a:rPr lang="en-US" altLang="ko-KR" smtClean="0"/>
-              <a:t>5/26/2025</a:t>
+              <a:t>5/28/2025</a:t>
             </a:fld>
             <a:endParaRPr lang="en-US" dirty="0"/>
           </a:p>
@@ -3602,7 +3602,7 @@
           <a:p>
             <a:fld id="{2DDEDEE1-E40E-4F89-9B8F-B367327C511C}" type="datetime1">
               <a:rPr lang="en-US" altLang="ko-KR" smtClean="0"/>
-              <a:t>5/26/2025</a:t>
+              <a:t>5/28/2025</a:t>
             </a:fld>
             <a:endParaRPr lang="en-US" dirty="0"/>
           </a:p>
@@ -3767,7 +3767,7 @@
           <a:p>
             <a:fld id="{7563BC62-6CEA-45BD-92A5-5013FFA82658}" type="datetime1">
               <a:rPr lang="en-US" altLang="ko-KR" smtClean="0"/>
-              <a:t>5/26/2025</a:t>
+              <a:t>5/28/2025</a:t>
             </a:fld>
             <a:endParaRPr lang="en-US" dirty="0"/>
           </a:p>
@@ -4009,7 +4009,7 @@
           <a:p>
             <a:fld id="{013F6650-8A32-4421-A803-CC561A36AE32}" type="datetime1">
               <a:rPr lang="en-US" altLang="ko-KR" smtClean="0"/>
-              <a:t>5/26/2025</a:t>
+              <a:t>5/28/2025</a:t>
             </a:fld>
             <a:endParaRPr lang="en-US" dirty="0"/>
           </a:p>
@@ -4296,7 +4296,7 @@
           <a:p>
             <a:fld id="{AF8A2F51-755C-4F45-BAA6-B0C249D4F111}" type="datetime1">
               <a:rPr lang="en-US" altLang="ko-KR" smtClean="0"/>
-              <a:t>5/26/2025</a:t>
+              <a:t>5/28/2025</a:t>
             </a:fld>
             <a:endParaRPr lang="en-US" dirty="0"/>
           </a:p>
@@ -4735,7 +4735,7 @@
           <a:p>
             <a:fld id="{B457C7EE-A746-49D8-9F32-6010E93B2218}" type="datetime1">
               <a:rPr lang="en-US" altLang="ko-KR" smtClean="0"/>
-              <a:t>5/26/2025</a:t>
+              <a:t>5/28/2025</a:t>
             </a:fld>
             <a:endParaRPr lang="en-US" dirty="0"/>
           </a:p>
@@ -4848,7 +4848,7 @@
           <a:p>
             <a:fld id="{3A9D936D-3553-4130-B94B-ED50ED37898C}" type="datetime1">
               <a:rPr lang="en-US" altLang="ko-KR" smtClean="0"/>
-              <a:t>5/26/2025</a:t>
+              <a:t>5/28/2025</a:t>
             </a:fld>
             <a:endParaRPr lang="en-US" dirty="0"/>
           </a:p>
@@ -4938,7 +4938,7 @@
           <a:p>
             <a:fld id="{7BBCF47B-5370-48B5-AB64-CA93D4B3F64E}" type="datetime1">
               <a:rPr lang="en-US" altLang="ko-KR" smtClean="0"/>
-              <a:t>5/26/2025</a:t>
+              <a:t>5/28/2025</a:t>
             </a:fld>
             <a:endParaRPr lang="en-US" dirty="0"/>
           </a:p>
@@ -5212,7 +5212,7 @@
           <a:p>
             <a:fld id="{62E82200-0CBD-47EA-A0C7-23162BC9B53A}" type="datetime1">
               <a:rPr lang="en-US" altLang="ko-KR" smtClean="0"/>
-              <a:t>5/26/2025</a:t>
+              <a:t>5/28/2025</a:t>
             </a:fld>
             <a:endParaRPr lang="en-US" dirty="0"/>
           </a:p>
@@ -5482,7 +5482,7 @@
           <a:p>
             <a:fld id="{50EAD86A-1128-4AC1-9410-89647BB2A01D}" type="datetime1">
               <a:rPr lang="en-US" altLang="ko-KR" smtClean="0"/>
-              <a:t>5/26/2025</a:t>
+              <a:t>5/28/2025</a:t>
             </a:fld>
             <a:endParaRPr lang="en-US" dirty="0"/>
           </a:p>
@@ -5906,7 +5906,7 @@
           <a:p>
             <a:fld id="{A775DCF0-6488-474F-AA91-7533C1D9B39A}" type="datetime1">
               <a:rPr lang="en-US" altLang="ko-KR" smtClean="0"/>
-              <a:t>5/26/2025</a:t>
+              <a:t>5/28/2025</a:t>
             </a:fld>
             <a:endParaRPr lang="en-US" dirty="0"/>
           </a:p>
@@ -17543,14 +17543,14 @@
           <p:nvPr>
             <p:extLst>
               <p:ext uri="{D42A27DB-BD31-4B8C-83A1-F6EECF244321}">
-                <p14:modId xmlns:p14="http://schemas.microsoft.com/office/powerpoint/2010/main" val="1441799098"/>
+                <p14:modId xmlns:p14="http://schemas.microsoft.com/office/powerpoint/2010/main" val="3666368641"/>
               </p:ext>
             </p:extLst>
           </p:nvPr>
         </p:nvGraphicFramePr>
         <p:xfrm>
-          <a:off x="6404363" y="1560259"/>
-          <a:ext cx="4786376" cy="4079240"/>
+          <a:off x="6025896" y="1560259"/>
+          <a:ext cx="5164843" cy="4226560"/>
         </p:xfrm>
         <a:graphic>
           <a:graphicData uri="http://schemas.openxmlformats.org/drawingml/2006/table">
@@ -17559,14 +17559,14 @@
                 <a:tableStyleId>{616DA210-FB5B-4158-B5E0-FEB733F419BA}</a:tableStyleId>
               </a:tblPr>
               <a:tblGrid>
-                <a:gridCol w="1371085">
+                <a:gridCol w="1865376">
                   <a:extLst>
                     <a:ext uri="{9D8B030D-6E8A-4147-A177-3AD203B41FA5}">
                       <a16:colId xmlns:a16="http://schemas.microsoft.com/office/drawing/2014/main" val="1797959915"/>
                     </a:ext>
                   </a:extLst>
                 </a:gridCol>
-                <a:gridCol w="3415291">
+                <a:gridCol w="3299467">
                   <a:extLst>
                     <a:ext uri="{9D8B030D-6E8A-4147-A177-3AD203B41FA5}">
                       <a16:colId xmlns:a16="http://schemas.microsoft.com/office/drawing/2014/main" val="1458635959"/>
@@ -17998,10 +17998,18 @@
                     <a:p>
                       <a:pPr latinLnBrk="1"/>
                       <a:r>
-                        <a:rPr lang="en-US" altLang="ko-KR" sz="1400" dirty="0"/>
+                        <a:rPr lang="en-US" altLang="ko-KR" sz="2800" b="1" dirty="0">
+                          <a:solidFill>
+                            <a:srgbClr val="FF0000"/>
+                          </a:solidFill>
+                        </a:rPr>
                         <a:t>Package</a:t>
                       </a:r>
-                      <a:endParaRPr lang="ko-KR" altLang="en-US" sz="1400" dirty="0"/>
+                      <a:endParaRPr lang="ko-KR" altLang="en-US" sz="1400" b="1" dirty="0">
+                        <a:solidFill>
+                          <a:srgbClr val="FF0000"/>
+                        </a:solidFill>
+                      </a:endParaRPr>
                     </a:p>
                   </a:txBody>
                   <a:tcPr/>
@@ -18013,16 +18021,16 @@
                     <a:p>
                       <a:pPr latinLnBrk="1"/>
                       <a:r>
-                        <a:rPr lang="en-US" altLang="ko-KR" sz="1400" b="1" dirty="0" err="1">
+                        <a:rPr lang="en-US" altLang="ko-KR" sz="2800" b="1" dirty="0" err="1">
                           <a:solidFill>
-                            <a:srgbClr val="FF0000"/>
+                            <a:schemeClr val="tx1"/>
                           </a:solidFill>
                         </a:rPr>
                         <a:t>egov</a:t>
                       </a:r>
                       <a:endParaRPr lang="ko-KR" altLang="en-US" sz="1400" b="1" dirty="0">
                         <a:solidFill>
-                          <a:srgbClr val="FF0000"/>
+                          <a:schemeClr val="tx1"/>
                         </a:solidFill>
                       </a:endParaRPr>
                     </a:p>

</xml_diff>